<commit_message>
Updated file after exam 20230728
</commit_message>
<xml_diff>
--- a/sem-1/ECAP448/ECAP448-LECTURES-PPT/ECAP448_U05_T01_PowerPoint.pptx
+++ b/sem-1/ECAP448/ECAP448-LECTURES-PPT/ECAP448_U05_T01_PowerPoint.pptx
@@ -1459,7 +1459,7 @@
               <a:pPr>
                 <a:defRPr/>
               </a:pPr>
-              <a:t>3/15/2021</a:t>
+              <a:t>6/30/23</a:t>
             </a:fld>
             <a:endParaRPr lang="en-US"/>
           </a:p>
@@ -1764,7 +1764,7 @@
               <a:pPr>
                 <a:defRPr/>
               </a:pPr>
-              <a:t>3/15/2021</a:t>
+              <a:t>6/30/23</a:t>
             </a:fld>
             <a:endParaRPr lang="en-US"/>
           </a:p>
@@ -1979,7 +1979,7 @@
               <a:pPr>
                 <a:defRPr/>
               </a:pPr>
-              <a:t>3/15/2021</a:t>
+              <a:t>6/30/23</a:t>
             </a:fld>
             <a:endParaRPr lang="en-US"/>
           </a:p>
@@ -2204,7 +2204,7 @@
               <a:pPr>
                 <a:defRPr/>
               </a:pPr>
-              <a:t>3/15/2021</a:t>
+              <a:t>6/30/23</a:t>
             </a:fld>
             <a:endParaRPr lang="en-US"/>
           </a:p>
@@ -3618,7 +3618,7 @@
               <a:pPr>
                 <a:defRPr/>
               </a:pPr>
-              <a:t>3/15/2021</a:t>
+              <a:t>6/30/23</a:t>
             </a:fld>
             <a:endParaRPr lang="en-US"/>
           </a:p>
@@ -3925,7 +3925,7 @@
               <a:pPr>
                 <a:defRPr/>
               </a:pPr>
-              <a:t>3/15/2021</a:t>
+              <a:t>6/30/23</a:t>
             </a:fld>
             <a:endParaRPr lang="en-US"/>
           </a:p>
@@ -4337,7 +4337,7 @@
               <a:pPr>
                 <a:defRPr/>
               </a:pPr>
-              <a:t>3/15/2021</a:t>
+              <a:t>6/30/23</a:t>
             </a:fld>
             <a:endParaRPr lang="en-US"/>
           </a:p>
@@ -4500,7 +4500,7 @@
               <a:pPr>
                 <a:defRPr/>
               </a:pPr>
-              <a:t>3/15/2021</a:t>
+              <a:t>6/30/23</a:t>
             </a:fld>
             <a:endParaRPr lang="en-US"/>
           </a:p>
@@ -4833,7 +4833,7 @@
               <a:pPr>
                 <a:defRPr/>
               </a:pPr>
-              <a:t>3/15/2021</a:t>
+              <a:t>6/30/23</a:t>
             </a:fld>
             <a:endParaRPr lang="en-US"/>
           </a:p>
@@ -8941,7 +8941,7 @@
         </p:blipFill>
         <p:spPr>
           <a:xfrm>
-            <a:off x="1452563" y="1404938"/>
+            <a:off x="1452563" y="1427798"/>
             <a:ext cx="6400800" cy="5181600"/>
           </a:xfrm>
           <a:ln>

</xml_diff>